<commit_message>
final / presentation succeeded
</commit_message>
<xml_diff>
--- a/SQLKonferenz2023/mainContent_sept2023.pptx
+++ b/SQLKonferenz2023/mainContent_sept2023.pptx
@@ -266,7 +266,7 @@
           <a:p>
             <a:fld id="{0EBF6EC3-BD09-4589-B3EB-2ED451FC318B}" type="datetimeFigureOut">
               <a:rPr lang="de-DE" smtClean="0"/>
-              <a:t>10.09.2023</a:t>
+              <a:t>12.09.2023</a:t>
             </a:fld>
             <a:endParaRPr lang="de-DE"/>
           </a:p>
@@ -424,7 +424,7 @@
           <a:p>
             <a:fld id="{B9833A8D-0424-455F-B96F-CED03D6AAAEB}" type="slidenum">
               <a:rPr lang="de-DE" smtClean="0"/>
-              <a:t>‹#›</a:t>
+              <a:t>‹Nr.›</a:t>
             </a:fld>
             <a:endParaRPr lang="de-DE"/>
           </a:p>
@@ -5212,7 +5212,7 @@
           <a:p>
             <a:fld id="{C92077F2-30EF-4E9A-90C6-FB235609FA6D}" type="datetimeFigureOut">
               <a:rPr lang="de-DE" smtClean="0"/>
-              <a:t>10.09.2023</a:t>
+              <a:t>12.09.2023</a:t>
             </a:fld>
             <a:endParaRPr lang="de-DE"/>
           </a:p>
@@ -5266,7 +5266,7 @@
           <a:p>
             <a:fld id="{EDC5EF5A-ADF0-4964-ACE9-11317F307D2A}" type="slidenum">
               <a:rPr lang="de-DE" smtClean="0"/>
-              <a:t>‹#›</a:t>
+              <a:t>‹Nr.›</a:t>
             </a:fld>
             <a:endParaRPr lang="de-DE"/>
           </a:p>
@@ -10483,8 +10483,8 @@
         </p:blipFill>
         <p:spPr>
           <a:xfrm>
-            <a:off x="8002420" y="2666881"/>
-            <a:ext cx="1006166" cy="1006166"/>
+            <a:off x="8128118" y="3819993"/>
+            <a:ext cx="521796" cy="521796"/>
           </a:xfrm>
           <a:prstGeom prst="rect">
             <a:avLst/>
@@ -10519,8 +10519,8 @@
         </p:blipFill>
         <p:spPr>
           <a:xfrm>
-            <a:off x="6990001" y="3758669"/>
-            <a:ext cx="1006167" cy="1006167"/>
+            <a:off x="6742234" y="3820539"/>
+            <a:ext cx="521797" cy="521797"/>
           </a:xfrm>
           <a:prstGeom prst="rect">
             <a:avLst/>
@@ -10549,8 +10549,8 @@
         </p:blipFill>
         <p:spPr>
           <a:xfrm>
-            <a:off x="6008937" y="3746544"/>
-            <a:ext cx="1006167" cy="1006167"/>
+            <a:off x="6148792" y="3820539"/>
+            <a:ext cx="521797" cy="521797"/>
           </a:xfrm>
           <a:prstGeom prst="rect">
             <a:avLst/>
@@ -10579,8 +10579,8 @@
         </p:blipFill>
         <p:spPr>
           <a:xfrm>
-            <a:off x="7996168" y="3752418"/>
-            <a:ext cx="1018671" cy="1018671"/>
+            <a:off x="7432131" y="3820539"/>
+            <a:ext cx="528282" cy="528282"/>
           </a:xfrm>
           <a:prstGeom prst="rect">
             <a:avLst/>
@@ -13370,6 +13370,26 @@
 </file>
 
 <file path=customXml/item1.xml><?xml version="1.0" encoding="utf-8"?>
+<?mso-contentType ?>
+<FormTemplates xmlns="http://schemas.microsoft.com/sharepoint/v3/contenttype/forms">
+  <Display>DocumentLibraryForm</Display>
+  <Edit>DocumentLibraryForm</Edit>
+  <New>DocumentLibraryForm</New>
+</FormTemplates>
+</file>
+
+<file path=customXml/item2.xml><?xml version="1.0" encoding="utf-8"?>
+<p:properties xmlns:p="http://schemas.microsoft.com/office/2006/metadata/properties" xmlns:xsi="http://www.w3.org/2001/XMLSchema-instance" xmlns:pc="http://schemas.microsoft.com/office/infopath/2007/PartnerControls">
+  <documentManagement>
+    <TaxCatchAll xmlns="c01db75f-99ac-4393-b867-273875719344" xsi:nil="true"/>
+    <lcf76f155ced4ddcb4097134ff3c332f xmlns="11daf065-267b-4a2e-a448-9bdbef5c8168">
+      <Terms xmlns="http://schemas.microsoft.com/office/infopath/2007/PartnerControls"/>
+    </lcf76f155ced4ddcb4097134ff3c332f>
+  </documentManagement>
+</p:properties>
+</file>
+
+<file path=customXml/item3.xml><?xml version="1.0" encoding="utf-8"?>
 <ct:contentTypeSchema xmlns:ct="http://schemas.microsoft.com/office/2006/metadata/contentType" xmlns:ma="http://schemas.microsoft.com/office/2006/metadata/properties/metaAttributes" ct:_="" ma:_="" ma:contentTypeName="Dokument" ma:contentTypeID="0x010100DAEC18B4C8213F499EF95726DBB3EDFF" ma:contentTypeVersion="15" ma:contentTypeDescription="Ein neues Dokument erstellen." ma:contentTypeScope="" ma:versionID="25c1e22b8b62fdb73162f4fe8ba619c3">
   <xsd:schema xmlns:xsd="http://www.w3.org/2001/XMLSchema" xmlns:xs="http://www.w3.org/2001/XMLSchema" xmlns:p="http://schemas.microsoft.com/office/2006/metadata/properties" xmlns:ns2="11daf065-267b-4a2e-a448-9bdbef5c8168" xmlns:ns3="c01db75f-99ac-4393-b867-273875719344" targetNamespace="http://schemas.microsoft.com/office/2006/metadata/properties" ma:root="true" ma:fieldsID="293534c9201496bf817d1250b78f0d49" ns2:_="" ns3:_="">
     <xsd:import namespace="11daf065-267b-4a2e-a448-9bdbef5c8168"/>
@@ -13604,27 +13624,32 @@
 </ct:contentTypeSchema>
 </file>
 
-<file path=customXml/item2.xml><?xml version="1.0" encoding="utf-8"?>
-<?mso-contentType ?>
-<FormTemplates xmlns="http://schemas.microsoft.com/sharepoint/v3/contenttype/forms">
-  <Display>DocumentLibraryForm</Display>
-  <Edit>DocumentLibraryForm</Edit>
-  <New>DocumentLibraryForm</New>
-</FormTemplates>
+<file path=customXml/itemProps1.xml><?xml version="1.0" encoding="utf-8"?>
+<ds:datastoreItem xmlns:ds="http://schemas.openxmlformats.org/officeDocument/2006/customXml" ds:itemID="{6346D778-002C-40B9-B02C-4FE70486188F}">
+  <ds:schemaRefs>
+    <ds:schemaRef ds:uri="http://schemas.microsoft.com/sharepoint/v3/contenttype/forms"/>
+  </ds:schemaRefs>
+</ds:datastoreItem>
 </file>
 
-<file path=customXml/item3.xml><?xml version="1.0" encoding="utf-8"?>
-<p:properties xmlns:p="http://schemas.microsoft.com/office/2006/metadata/properties" xmlns:xsi="http://www.w3.org/2001/XMLSchema-instance" xmlns:pc="http://schemas.microsoft.com/office/infopath/2007/PartnerControls">
-  <documentManagement>
-    <TaxCatchAll xmlns="c01db75f-99ac-4393-b867-273875719344" xsi:nil="true"/>
-    <lcf76f155ced4ddcb4097134ff3c332f xmlns="11daf065-267b-4a2e-a448-9bdbef5c8168">
-      <Terms xmlns="http://schemas.microsoft.com/office/infopath/2007/PartnerControls"/>
-    </lcf76f155ced4ddcb4097134ff3c332f>
-  </documentManagement>
-</p:properties>
+<file path=customXml/itemProps2.xml><?xml version="1.0" encoding="utf-8"?>
+<ds:datastoreItem xmlns:ds="http://schemas.openxmlformats.org/officeDocument/2006/customXml" ds:itemID="{529D937B-3F00-4EF4-9B83-837C4D306D8F}">
+  <ds:schemaRefs>
+    <ds:schemaRef ds:uri="http://schemas.microsoft.com/office/2006/documentManagement/types"/>
+    <ds:schemaRef ds:uri="http://www.w3.org/XML/1998/namespace"/>
+    <ds:schemaRef ds:uri="11daf065-267b-4a2e-a448-9bdbef5c8168"/>
+    <ds:schemaRef ds:uri="http://schemas.microsoft.com/office/2006/metadata/properties"/>
+    <ds:schemaRef ds:uri="http://purl.org/dc/elements/1.1/"/>
+    <ds:schemaRef ds:uri="http://purl.org/dc/dcmitype/"/>
+    <ds:schemaRef ds:uri="http://schemas.microsoft.com/office/infopath/2007/PartnerControls"/>
+    <ds:schemaRef ds:uri="http://schemas.openxmlformats.org/package/2006/metadata/core-properties"/>
+    <ds:schemaRef ds:uri="c01db75f-99ac-4393-b867-273875719344"/>
+    <ds:schemaRef ds:uri="http://purl.org/dc/terms/"/>
+  </ds:schemaRefs>
+</ds:datastoreItem>
 </file>
 
-<file path=customXml/itemProps1.xml><?xml version="1.0" encoding="utf-8"?>
+<file path=customXml/itemProps3.xml><?xml version="1.0" encoding="utf-8"?>
 <ds:datastoreItem xmlns:ds="http://schemas.openxmlformats.org/officeDocument/2006/customXml" ds:itemID="{7AC14FE0-4374-4D37-928B-DE5715260CE3}">
   <ds:schemaRefs>
     <ds:schemaRef ds:uri="11daf065-267b-4a2e-a448-9bdbef5c8168"/>
@@ -13641,29 +13666,4 @@
     <ds:schemaRef ds:uri="http://www.w3.org/2001/XMLSchema"/>
   </ds:schemaRefs>
 </ds:datastoreItem>
-</file>
-
-<file path=customXml/itemProps2.xml><?xml version="1.0" encoding="utf-8"?>
-<ds:datastoreItem xmlns:ds="http://schemas.openxmlformats.org/officeDocument/2006/customXml" ds:itemID="{6346D778-002C-40B9-B02C-4FE70486188F}">
-  <ds:schemaRefs>
-    <ds:schemaRef ds:uri="http://schemas.microsoft.com/sharepoint/v3/contenttype/forms"/>
-  </ds:schemaRefs>
-</ds:datastoreItem>
-</file>
-
-<file path=customXml/itemProps3.xml><?xml version="1.0" encoding="utf-8"?>
-<ds:datastoreItem xmlns:ds="http://schemas.openxmlformats.org/officeDocument/2006/customXml" ds:itemID="{529D937B-3F00-4EF4-9B83-837C4D306D8F}">
-  <ds:schemaRefs>
-    <ds:schemaRef ds:uri="http://schemas.microsoft.com/office/2006/documentManagement/types"/>
-    <ds:schemaRef ds:uri="http://www.w3.org/XML/1998/namespace"/>
-    <ds:schemaRef ds:uri="11daf065-267b-4a2e-a448-9bdbef5c8168"/>
-    <ds:schemaRef ds:uri="http://schemas.microsoft.com/office/2006/metadata/properties"/>
-    <ds:schemaRef ds:uri="http://purl.org/dc/elements/1.1/"/>
-    <ds:schemaRef ds:uri="http://purl.org/dc/dcmitype/"/>
-    <ds:schemaRef ds:uri="http://schemas.microsoft.com/office/infopath/2007/PartnerControls"/>
-    <ds:schemaRef ds:uri="http://schemas.openxmlformats.org/package/2006/metadata/core-properties"/>
-    <ds:schemaRef ds:uri="c01db75f-99ac-4393-b867-273875719344"/>
-    <ds:schemaRef ds:uri="http://purl.org/dc/terms/"/>
-  </ds:schemaRefs>
-</ds:datastoreItem>
 </file>
</xml_diff>